<commit_message>
added ta2 simon video link and readme.md
</commit_message>
<xml_diff>
--- a/Classes/week_02/ta2/simon_group/oop2.pptx
+++ b/Classes/week_02/ta2/simon_group/oop2.pptx
@@ -218,7 +218,7 @@
           <a:p>
             <a:fld id="{9DA59C4F-E499-4036-8FB9-B77BEC02A5D1}" type="datetimeFigureOut">
               <a:rPr lang="he-IL" smtClean="0"/>
-              <a:t>י'/חשון/תשפ"א</a:t>
+              <a:t>י"ב/חשון/תשפ"א</a:t>
             </a:fld>
             <a:endParaRPr lang="he-IL"/>
           </a:p>
@@ -871,7 +871,7 @@
           <a:p>
             <a:fld id="{F9F2E34D-57B0-41D5-A7AF-DF10D1068115}" type="datetime1">
               <a:rPr lang="en-US" smtClean="0"/>
-              <a:t>10/28/2020</a:t>
+              <a:t>10/30/2020</a:t>
             </a:fld>
             <a:endParaRPr lang="en-US" dirty="0"/>
           </a:p>
@@ -1076,7 +1076,7 @@
           <a:p>
             <a:fld id="{BF56EAF9-2583-4989-8D87-13F548ED6E0C}" type="datetime1">
               <a:rPr lang="en-US" smtClean="0"/>
-              <a:t>10/28/2020</a:t>
+              <a:t>10/30/2020</a:t>
             </a:fld>
             <a:endParaRPr lang="en-US" dirty="0"/>
           </a:p>
@@ -1296,7 +1296,7 @@
           <a:p>
             <a:fld id="{4E3F0A0B-291C-4112-A023-023C51AB2E85}" type="datetime1">
               <a:rPr lang="en-US" smtClean="0"/>
-              <a:t>10/28/2020</a:t>
+              <a:t>10/30/2020</a:t>
             </a:fld>
             <a:endParaRPr lang="en-US" dirty="0"/>
           </a:p>
@@ -12632,7 +12632,7 @@
         </p:nvSpPr>
         <p:spPr>
           <a:xfrm>
-            <a:off x="2998551" y="290151"/>
+            <a:off x="2998551" y="261870"/>
             <a:ext cx="9166168" cy="3201193"/>
           </a:xfrm>
         </p:spPr>
@@ -14073,18 +14073,18 @@
 </file>
 
 <file path=customXml/item1.xml><?xml version="1.0" encoding="utf-8"?>
+<p:properties xmlns:p="http://schemas.microsoft.com/office/2006/metadata/properties" xmlns:xsi="http://www.w3.org/2001/XMLSchema-instance" xmlns:pc="http://schemas.microsoft.com/office/infopath/2007/PartnerControls">
+  <documentManagement/>
+</p:properties>
+</file>
+
+<file path=customXml/item2.xml><?xml version="1.0" encoding="utf-8"?>
 <?mso-contentType ?>
 <FormTemplates xmlns="http://schemas.microsoft.com/sharepoint/v3/contenttype/forms">
   <Display>DocumentLibraryForm</Display>
   <Edit>DocumentLibraryForm</Edit>
   <New>DocumentLibraryForm</New>
 </FormTemplates>
-</file>
-
-<file path=customXml/item2.xml><?xml version="1.0" encoding="utf-8"?>
-<p:properties xmlns:p="http://schemas.microsoft.com/office/2006/metadata/properties" xmlns:xsi="http://www.w3.org/2001/XMLSchema-instance" xmlns:pc="http://schemas.microsoft.com/office/infopath/2007/PartnerControls">
-  <documentManagement/>
-</p:properties>
 </file>
 
 <file path=customXml/item3.xml><?xml version="1.0" encoding="utf-8"?>
@@ -14259,14 +14259,6 @@
 </file>
 
 <file path=customXml/itemProps1.xml><?xml version="1.0" encoding="utf-8"?>
-<ds:datastoreItem xmlns:ds="http://schemas.openxmlformats.org/officeDocument/2006/customXml" ds:itemID="{A77D7CE5-D6DD-4069-86F4-BB2DDC4628BD}">
-  <ds:schemaRefs>
-    <ds:schemaRef ds:uri="http://schemas.microsoft.com/sharepoint/v3/contenttype/forms"/>
-  </ds:schemaRefs>
-</ds:datastoreItem>
-</file>
-
-<file path=customXml/itemProps2.xml><?xml version="1.0" encoding="utf-8"?>
 <ds:datastoreItem xmlns:ds="http://schemas.openxmlformats.org/officeDocument/2006/customXml" ds:itemID="{75496198-2E38-4926-A1DA-329574697DDE}">
   <ds:schemaRefs>
     <ds:schemaRef ds:uri="http://schemas.openxmlformats.org/package/2006/metadata/core-properties"/>
@@ -14279,6 +14271,14 @@
     <ds:schemaRef ds:uri="http://purl.org/dc/terms/"/>
     <ds:schemaRef ds:uri="http://schemas.microsoft.com/office/infopath/2007/PartnerControls"/>
     <ds:schemaRef ds:uri="http://schemas.microsoft.com/office/2006/metadata/properties"/>
+  </ds:schemaRefs>
+</ds:datastoreItem>
+</file>
+
+<file path=customXml/itemProps2.xml><?xml version="1.0" encoding="utf-8"?>
+<ds:datastoreItem xmlns:ds="http://schemas.openxmlformats.org/officeDocument/2006/customXml" ds:itemID="{A77D7CE5-D6DD-4069-86F4-BB2DDC4628BD}">
+  <ds:schemaRefs>
+    <ds:schemaRef ds:uri="http://schemas.microsoft.com/sharepoint/v3/contenttype/forms"/>
   </ds:schemaRefs>
 </ds:datastoreItem>
 </file>

</xml_diff>